<commit_message>
updated recipe sys doc.
</commit_message>
<xml_diff>
--- a/docs/RecipeSystem2.pptx
+++ b/docs/RecipeSystem2.pptx
@@ -6001,8 +6001,21 @@
               <a:buNone/>
             </a:pPr>
             <a:r>
+              <a:rPr lang="en-US" sz="1200"/>
+              <a:t>f</a:t>
+            </a:r>
+            <a:r>
               <a:rPr lang="en-US" sz="1200" smtClean="0"/>
-              <a:t>rm = rtest.RecipeMapper(ad)</a:t>
+              <a:t>rom recipeMapper import RecipeMapper</a:t>
+            </a:r>
+          </a:p>
+          <a:p>
+            <a:pPr marL="400050" lvl="1" indent="0">
+              <a:buNone/>
+            </a:pPr>
+            <a:r>
+              <a:rPr lang="en-US" sz="1200" smtClean="0"/>
+              <a:t>rm = RecipeMapper(ad)</a:t>
             </a:r>
           </a:p>
           <a:p>
@@ -6342,12 +6355,8 @@
               <a:t>= </a:t>
             </a:r>
             <a:r>
-              <a:rPr lang="en-US" sz="1000"/>
-              <a:t>rtest.RecipeMapper</a:t>
-            </a:r>
-            <a:r>
               <a:rPr lang="en-US" sz="1000" smtClean="0"/>
-              <a:t>(ad</a:t>
+              <a:t>RecipeMapper(ad</a:t>
             </a:r>
             <a:r>
               <a:rPr lang="en-US" sz="1000"/>

</xml_diff>